<commit_message>
Power Point, ReadME updates, and Sequence Diagram
</commit_message>
<xml_diff>
--- a/SWD Project Plan.pptx
+++ b/SWD Project Plan.pptx
@@ -7,10 +7,11 @@
   <p:sldIdLst>
     <p:sldId id="256" r:id="rId2"/>
     <p:sldId id="257" r:id="rId3"/>
-    <p:sldId id="258" r:id="rId4"/>
+    <p:sldId id="262" r:id="rId4"/>
     <p:sldId id="259" r:id="rId5"/>
-    <p:sldId id="260" r:id="rId6"/>
+    <p:sldId id="263" r:id="rId6"/>
     <p:sldId id="261" r:id="rId7"/>
+    <p:sldId id="264" r:id="rId8"/>
   </p:sldIdLst>
   <p:sldSz cx="12192000" cy="6858000"/>
   <p:notesSz cx="6858000" cy="9144000"/>
@@ -109,6 +110,11 @@
       </a:defRPr>
     </a:lvl9pPr>
   </p:defaultTextStyle>
+  <p:extLst>
+    <p:ext uri="{EFAFB233-063F-42B5-8137-9DF3F51BA10A}">
+      <p15:sldGuideLst xmlns:p15="http://schemas.microsoft.com/office/powerpoint/2012/main"/>
+    </p:ext>
+  </p:extLst>
 </p:presentation>
 </file>
 
@@ -297,7 +303,7 @@
           <a:p>
             <a:fld id="{1E897544-ABA6-420B-8106-CC874CB02088}" type="datetimeFigureOut">
               <a:rPr lang="en-US" smtClean="0"/>
-              <a:t>4/8/2023</a:t>
+              <a:t>4/10/23</a:t>
             </a:fld>
             <a:endParaRPr lang="en-US"/>
           </a:p>
@@ -595,7 +601,7 @@
           <a:p>
             <a:fld id="{1E897544-ABA6-420B-8106-CC874CB02088}" type="datetimeFigureOut">
               <a:rPr lang="en-US" smtClean="0"/>
-              <a:t>4/8/2023</a:t>
+              <a:t>4/10/23</a:t>
             </a:fld>
             <a:endParaRPr lang="en-US"/>
           </a:p>
@@ -787,7 +793,7 @@
           <a:p>
             <a:fld id="{1E897544-ABA6-420B-8106-CC874CB02088}" type="datetimeFigureOut">
               <a:rPr lang="en-US" smtClean="0"/>
-              <a:t>4/8/2023</a:t>
+              <a:t>4/10/23</a:t>
             </a:fld>
             <a:endParaRPr lang="en-US"/>
           </a:p>
@@ -1048,7 +1054,7 @@
           <a:p>
             <a:fld id="{1E897544-ABA6-420B-8106-CC874CB02088}" type="datetimeFigureOut">
               <a:rPr lang="en-US" smtClean="0"/>
-              <a:t>4/8/2023</a:t>
+              <a:t>4/10/23</a:t>
             </a:fld>
             <a:endParaRPr lang="en-US"/>
           </a:p>
@@ -1472,7 +1478,7 @@
           <a:p>
             <a:fld id="{1E897544-ABA6-420B-8106-CC874CB02088}" type="datetimeFigureOut">
               <a:rPr lang="en-US" smtClean="0"/>
-              <a:t>4/8/2023</a:t>
+              <a:t>4/10/23</a:t>
             </a:fld>
             <a:endParaRPr lang="en-US"/>
           </a:p>
@@ -2009,7 +2015,7 @@
           <a:p>
             <a:fld id="{1E897544-ABA6-420B-8106-CC874CB02088}" type="datetimeFigureOut">
               <a:rPr lang="en-US" smtClean="0"/>
-              <a:t>4/8/2023</a:t>
+              <a:t>4/10/23</a:t>
             </a:fld>
             <a:endParaRPr lang="en-US"/>
           </a:p>
@@ -2873,7 +2879,7 @@
           <a:p>
             <a:fld id="{1E897544-ABA6-420B-8106-CC874CB02088}" type="datetimeFigureOut">
               <a:rPr lang="en-US" smtClean="0"/>
-              <a:t>4/8/2023</a:t>
+              <a:t>4/10/23</a:t>
             </a:fld>
             <a:endParaRPr lang="en-US"/>
           </a:p>
@@ -3043,7 +3049,7 @@
           <a:p>
             <a:fld id="{1E897544-ABA6-420B-8106-CC874CB02088}" type="datetimeFigureOut">
               <a:rPr lang="en-US" smtClean="0"/>
-              <a:t>4/8/2023</a:t>
+              <a:t>4/10/23</a:t>
             </a:fld>
             <a:endParaRPr lang="en-US"/>
           </a:p>
@@ -3227,7 +3233,7 @@
           <a:p>
             <a:fld id="{1E897544-ABA6-420B-8106-CC874CB02088}" type="datetimeFigureOut">
               <a:rPr lang="en-US" smtClean="0"/>
-              <a:t>4/8/2023</a:t>
+              <a:t>4/10/23</a:t>
             </a:fld>
             <a:endParaRPr lang="en-US"/>
           </a:p>
@@ -3397,7 +3403,7 @@
           <a:p>
             <a:fld id="{1E897544-ABA6-420B-8106-CC874CB02088}" type="datetimeFigureOut">
               <a:rPr lang="en-US" smtClean="0"/>
-              <a:t>4/8/2023</a:t>
+              <a:t>4/10/23</a:t>
             </a:fld>
             <a:endParaRPr lang="en-US"/>
           </a:p>
@@ -3641,7 +3647,7 @@
           <a:p>
             <a:fld id="{1E897544-ABA6-420B-8106-CC874CB02088}" type="datetimeFigureOut">
               <a:rPr lang="en-US" smtClean="0"/>
-              <a:t>4/8/2023</a:t>
+              <a:t>4/10/23</a:t>
             </a:fld>
             <a:endParaRPr lang="en-US"/>
           </a:p>
@@ -3877,7 +3883,7 @@
           <a:p>
             <a:fld id="{1E897544-ABA6-420B-8106-CC874CB02088}" type="datetimeFigureOut">
               <a:rPr lang="en-US" smtClean="0"/>
-              <a:t>4/8/2023</a:t>
+              <a:t>4/10/23</a:t>
             </a:fld>
             <a:endParaRPr lang="en-US"/>
           </a:p>
@@ -4343,7 +4349,7 @@
           <a:p>
             <a:fld id="{1E897544-ABA6-420B-8106-CC874CB02088}" type="datetimeFigureOut">
               <a:rPr lang="en-US" smtClean="0"/>
-              <a:t>4/8/2023</a:t>
+              <a:t>4/10/23</a:t>
             </a:fld>
             <a:endParaRPr lang="en-US"/>
           </a:p>
@@ -4461,7 +4467,7 @@
           <a:p>
             <a:fld id="{1E897544-ABA6-420B-8106-CC874CB02088}" type="datetimeFigureOut">
               <a:rPr lang="en-US" smtClean="0"/>
-              <a:t>4/8/2023</a:t>
+              <a:t>4/10/23</a:t>
             </a:fld>
             <a:endParaRPr lang="en-US"/>
           </a:p>
@@ -4556,7 +4562,7 @@
           <a:p>
             <a:fld id="{1E897544-ABA6-420B-8106-CC874CB02088}" type="datetimeFigureOut">
               <a:rPr lang="en-US" smtClean="0"/>
-              <a:t>4/8/2023</a:t>
+              <a:t>4/10/23</a:t>
             </a:fld>
             <a:endParaRPr lang="en-US"/>
           </a:p>
@@ -4811,7 +4817,7 @@
           <a:p>
             <a:fld id="{1E897544-ABA6-420B-8106-CC874CB02088}" type="datetimeFigureOut">
               <a:rPr lang="en-US" smtClean="0"/>
-              <a:t>4/8/2023</a:t>
+              <a:t>4/10/23</a:t>
             </a:fld>
             <a:endParaRPr lang="en-US"/>
           </a:p>
@@ -5111,7 +5117,7 @@
           <a:p>
             <a:fld id="{1E897544-ABA6-420B-8106-CC874CB02088}" type="datetimeFigureOut">
               <a:rPr lang="en-US" smtClean="0"/>
-              <a:t>4/8/2023</a:t>
+              <a:t>4/10/23</a:t>
             </a:fld>
             <a:endParaRPr lang="en-US"/>
           </a:p>
@@ -5345,7 +5351,7 @@
           <a:p>
             <a:fld id="{1E897544-ABA6-420B-8106-CC874CB02088}" type="datetimeFigureOut">
               <a:rPr lang="en-US" smtClean="0"/>
-              <a:t>4/8/2023</a:t>
+              <a:t>4/10/23</a:t>
             </a:fld>
             <a:endParaRPr lang="en-US"/>
           </a:p>
@@ -6136,7 +6142,10 @@
           <a:bodyPr/>
           <a:lstStyle/>
           <a:p>
-            <a:endParaRPr lang="en-US" dirty="0"/>
+            <a:r>
+              <a:rPr lang="en-US" dirty="0"/>
+              <a:t>Overview</a:t>
+            </a:r>
           </a:p>
         </p:txBody>
       </p:sp>
@@ -6161,6 +6170,15 @@
           <a:bodyPr/>
           <a:lstStyle/>
           <a:p>
+            <a:pPr marL="36900" indent="0">
+              <a:buNone/>
+            </a:pPr>
+            <a:r>
+              <a:rPr lang="en-US" dirty="0"/>
+              <a:t>This PowerPoint will go over the tasks that need to be done to complete the project, how roles are designated among the group members, our rationale for our decision making, and the in order we will approach each Sprint.</a:t>
+            </a:r>
+          </a:p>
+          <a:p>
             <a:r>
               <a:rPr lang="en-US" dirty="0"/>
               <a:t>Overview</a:t>
@@ -6169,25 +6187,35 @@
           <a:p>
             <a:r>
               <a:rPr lang="en-US" dirty="0"/>
-              <a:t>Tasks</a:t>
-            </a:r>
+              <a:t>Programming Task</a:t>
+            </a:r>
+          </a:p>
+          <a:p>
+            <a:r>
+              <a:rPr lang="en-US"/>
+              <a:t>Miscellaneous Tasks</a:t>
+            </a:r>
+            <a:endParaRPr lang="en-US" dirty="0"/>
           </a:p>
           <a:p>
             <a:r>
               <a:rPr lang="en-US" dirty="0"/>
-              <a:t>Testing</a:t>
+              <a:t>Sprint 2 plan</a:t>
             </a:r>
           </a:p>
           <a:p>
             <a:r>
               <a:rPr lang="en-US" dirty="0"/>
-              <a:t>Documentation</a:t>
+              <a:t>Sprint 3 plan</a:t>
             </a:r>
           </a:p>
           <a:p>
             <a:pPr marL="36900" indent="0">
               <a:buNone/>
             </a:pPr>
+            <a:endParaRPr lang="en-US" dirty="0"/>
+          </a:p>
+          <a:p>
             <a:endParaRPr lang="en-US" dirty="0"/>
           </a:p>
         </p:txBody>
@@ -6227,7 +6255,7 @@
           <p:cNvPr id="2" name="Title 1">
             <a:extLst>
               <a:ext uri="{FF2B5EF4-FFF2-40B4-BE49-F238E27FC236}">
-                <a16:creationId xmlns:a16="http://schemas.microsoft.com/office/drawing/2014/main" id="{601DF631-1172-A15F-6351-9B1A3D7F5DDB}"/>
+                <a16:creationId xmlns:a16="http://schemas.microsoft.com/office/drawing/2014/main" id="{6EF00B2F-5DCD-CD8F-A340-DC26C9698A59}"/>
               </a:ext>
             </a:extLst>
           </p:cNvPr>
@@ -6245,7 +6273,7 @@
           <a:p>
             <a:r>
               <a:rPr lang="en-US" dirty="0"/>
-              <a:t>Overview</a:t>
+              <a:t>Programming Tasks</a:t>
             </a:r>
           </a:p>
         </p:txBody>
@@ -6255,7 +6283,7 @@
           <p:cNvPr id="3" name="Content Placeholder 2">
             <a:extLst>
               <a:ext uri="{FF2B5EF4-FFF2-40B4-BE49-F238E27FC236}">
-                <a16:creationId xmlns:a16="http://schemas.microsoft.com/office/drawing/2014/main" id="{4E7C438F-6661-2E04-43C8-BDF5ADB3B306}"/>
+                <a16:creationId xmlns:a16="http://schemas.microsoft.com/office/drawing/2014/main" id="{115DEF46-9003-692E-402B-6748BCCFC33E}"/>
               </a:ext>
             </a:extLst>
           </p:cNvPr>
@@ -6268,23 +6296,117 @@
         </p:nvSpPr>
         <p:spPr/>
         <p:txBody>
-          <a:bodyPr/>
-          <a:lstStyle/>
+          <a:bodyPr>
+            <a:normAutofit/>
+          </a:bodyPr>
+          <a:lstStyle/>
+          <a:p>
+            <a:r>
+              <a:rPr lang="en-US" dirty="0"/>
+              <a:t>Complete the </a:t>
+            </a:r>
+            <a:r>
+              <a:rPr lang="en-US" dirty="0" err="1"/>
+              <a:t>ReliabilityAnalysis.java</a:t>
+            </a:r>
+            <a:r>
+              <a:rPr lang="en-US" dirty="0"/>
+              <a:t> class</a:t>
+            </a:r>
+          </a:p>
+          <a:p>
+            <a:pPr lvl="1"/>
+            <a:r>
+              <a:rPr lang="en-US" dirty="0"/>
+              <a:t>Reliability Analysis will need to have the methods </a:t>
+            </a:r>
+            <a:r>
+              <a:rPr lang="en-US" dirty="0" err="1"/>
+              <a:t>getReliabilities</a:t>
+            </a:r>
+            <a:r>
+              <a:rPr lang="en-US" dirty="0"/>
+              <a:t> and </a:t>
+            </a:r>
+            <a:r>
+              <a:rPr lang="en-US" dirty="0" err="1"/>
+              <a:t>verifyReliabilties</a:t>
+            </a:r>
+            <a:r>
+              <a:rPr lang="en-US" dirty="0"/>
+              <a:t> implemented with three additional helper functions.</a:t>
+            </a:r>
+          </a:p>
+          <a:p>
+            <a:pPr lvl="1"/>
+            <a:r>
+              <a:rPr lang="en-US" dirty="0"/>
+              <a:t>Get Reliabilities will implement an algorithm that take in the workload and return the </a:t>
+            </a:r>
+            <a:r>
+              <a:rPr lang="en-US" dirty="0" err="1"/>
+              <a:t>RelaibilityTable</a:t>
+            </a:r>
+            <a:r>
+              <a:rPr lang="en-US" dirty="0"/>
+              <a:t> of the correct output. We imagine this being the hardest part of the project</a:t>
+            </a:r>
+          </a:p>
+          <a:p>
+            <a:r>
+              <a:rPr lang="en-US" dirty="0"/>
+              <a:t>Complete the </a:t>
+            </a:r>
+            <a:r>
+              <a:rPr lang="en-US" dirty="0" err="1"/>
+              <a:t>ReliabilityVisualization.java</a:t>
+            </a:r>
+            <a:r>
+              <a:rPr lang="en-US" dirty="0"/>
+              <a:t> class</a:t>
+            </a:r>
+          </a:p>
+          <a:p>
+            <a:pPr lvl="1"/>
+            <a:r>
+              <a:rPr lang="en-US" dirty="0"/>
+              <a:t>The initialize method will call Reliability Analysis to get the Reliability table then will format is as a Description Object to be used in creation of the “.</a:t>
+            </a:r>
+            <a:r>
+              <a:rPr lang="en-US" dirty="0" err="1"/>
+              <a:t>ra</a:t>
+            </a:r>
+            <a:r>
+              <a:rPr lang="en-US" dirty="0"/>
+              <a:t>” file.</a:t>
+            </a:r>
+          </a:p>
+          <a:p>
+            <a:r>
+              <a:rPr lang="en-US" dirty="0"/>
+              <a:t>These classes will need to be completed with methods that will allow for the creation of “.</a:t>
+            </a:r>
+            <a:r>
+              <a:rPr lang="en-US" dirty="0" err="1"/>
+              <a:t>ra</a:t>
+            </a:r>
+            <a:r>
+              <a:rPr lang="en-US" dirty="0"/>
+              <a:t>” files, an output file that shows the various parameters for input and the output of end-to-end reliability for each flow.</a:t>
+            </a:r>
+          </a:p>
           <a:p>
             <a:pPr marL="36900" indent="0">
               <a:buNone/>
             </a:pPr>
-            <a:r>
-              <a:rPr lang="en-US" dirty="0"/>
-              <a:t>This PowerPoint will go over the tasks that need to be done to complete the project, as well as designating responsibilities to group members so we can streamline the process of completing the project.</a:t>
-            </a:r>
+            <a:endParaRPr lang="en-US" dirty="0"/>
           </a:p>
         </p:txBody>
       </p:sp>
     </p:spTree>
     <p:extLst>
       <p:ext uri="{BB962C8B-B14F-4D97-AF65-F5344CB8AC3E}">
-        <p14:creationId xmlns:p14="http://schemas.microsoft.com/office/powerpoint/2010/main" val="201238405"/>
+        <p14:creationId xmlns:p14="http://schemas.microsoft.com/office/powerpoint/2010/main" val="640311364"/>
       </p:ext>
     </p:extLst>
   </p:cSld>
@@ -6334,7 +6456,7 @@
           <a:p>
             <a:r>
               <a:rPr lang="en-US" dirty="0"/>
-              <a:t>Tasks</a:t>
+              <a:t>Miscellaneous Task</a:t>
             </a:r>
           </a:p>
         </p:txBody>
@@ -6358,36 +6480,9 @@
         <p:spPr/>
         <p:txBody>
           <a:bodyPr>
-            <a:normAutofit lnSpcReduction="10000"/>
+            <a:normAutofit/>
           </a:bodyPr>
           <a:lstStyle/>
-          <a:p>
-            <a:r>
-              <a:rPr lang="en-US" dirty="0"/>
-              <a:t>Complete the ReliabilityAnalysis.java class</a:t>
-            </a:r>
-          </a:p>
-          <a:p>
-            <a:r>
-              <a:rPr lang="en-US" dirty="0"/>
-              <a:t>Complete the ReliabilityVisualization.java class</a:t>
-            </a:r>
-          </a:p>
-          <a:p>
-            <a:pPr lvl="1"/>
-            <a:r>
-              <a:rPr lang="en-US" dirty="0"/>
-              <a:t>These classes will need to be completed with methods that will allow for the creation of “.</a:t>
-            </a:r>
-            <a:r>
-              <a:rPr lang="en-US" dirty="0" err="1"/>
-              <a:t>ra</a:t>
-            </a:r>
-            <a:r>
-              <a:rPr lang="en-US" dirty="0"/>
-              <a:t>” files, an output file that shows the various parameters for input and the output of end-to-end reliability for each flow.</a:t>
-            </a:r>
-          </a:p>
           <a:p>
             <a:r>
               <a:rPr lang="en-US" dirty="0"/>
@@ -6408,20 +6503,18 @@
             </a:r>
           </a:p>
           <a:p>
-            <a:r>
-              <a:rPr lang="en-US" dirty="0" err="1"/>
-              <a:t>JavaDocs</a:t>
-            </a:r>
+            <a:pPr lvl="1"/>
             <a:r>
               <a:rPr lang="en-US" dirty="0"/>
-              <a:t> Documentation	</a:t>
-            </a:r>
-          </a:p>
-          <a:p>
-            <a:pPr marL="450000" lvl="1" indent="0">
-              <a:buNone/>
-            </a:pPr>
-            <a:endParaRPr lang="en-US" dirty="0"/>
+              <a:t>Many thorough tests will be used to ensure sustainability throughout the codebase and prevent errors from getting pushed to production in future changes</a:t>
+            </a:r>
+          </a:p>
+          <a:p>
+            <a:pPr lvl="1"/>
+            <a:r>
+              <a:rPr lang="en-US" dirty="0"/>
+              <a:t>Unit tests will be written before implementing the methods to follow Test Driven Development.</a:t>
+            </a:r>
           </a:p>
         </p:txBody>
       </p:sp>
@@ -6460,7 +6553,7 @@
           <p:cNvPr id="2" name="Title 1">
             <a:extLst>
               <a:ext uri="{FF2B5EF4-FFF2-40B4-BE49-F238E27FC236}">
-                <a16:creationId xmlns:a16="http://schemas.microsoft.com/office/drawing/2014/main" id="{75CF68F5-B94C-2F73-2BE0-776D840AB5B9}"/>
+                <a16:creationId xmlns:a16="http://schemas.microsoft.com/office/drawing/2014/main" id="{6EF00B2F-5DCD-CD8F-A340-DC26C9698A59}"/>
               </a:ext>
             </a:extLst>
           </p:cNvPr>
@@ -6478,7 +6571,7 @@
           <a:p>
             <a:r>
               <a:rPr lang="en-US" dirty="0"/>
-              <a:t>Testing</a:t>
+              <a:t>Miscellaneous Task Continued</a:t>
             </a:r>
           </a:p>
         </p:txBody>
@@ -6488,7 +6581,7 @@
           <p:cNvPr id="3" name="Content Placeholder 2">
             <a:extLst>
               <a:ext uri="{FF2B5EF4-FFF2-40B4-BE49-F238E27FC236}">
-                <a16:creationId xmlns:a16="http://schemas.microsoft.com/office/drawing/2014/main" id="{B8699FA8-48F0-9AF0-7BE8-703133054B27}"/>
+                <a16:creationId xmlns:a16="http://schemas.microsoft.com/office/drawing/2014/main" id="{115DEF46-9003-692E-402B-6748BCCFC33E}"/>
               </a:ext>
             </a:extLst>
           </p:cNvPr>
@@ -6501,20 +6594,59 @@
         </p:nvSpPr>
         <p:spPr/>
         <p:txBody>
-          <a:bodyPr/>
-          <a:lstStyle/>
-          <a:p>
-            <a:pPr marL="36900" indent="0">
+          <a:bodyPr>
+            <a:normAutofit/>
+          </a:bodyPr>
+          <a:lstStyle/>
+          <a:p>
+            <a:r>
+              <a:rPr lang="en-US" dirty="0" err="1"/>
+              <a:t>JavaDocs</a:t>
+            </a:r>
+            <a:endParaRPr lang="en-US" dirty="0"/>
+          </a:p>
+          <a:p>
+            <a:pPr lvl="1"/>
+            <a:r>
+              <a:rPr lang="en-US" dirty="0"/>
+              <a:t>New methods and attributes with have Javadoc compliant documentation.</a:t>
+            </a:r>
+          </a:p>
+          <a:p>
+            <a:pPr lvl="1"/>
+            <a:r>
+              <a:rPr lang="en-US" dirty="0"/>
+              <a:t>Documentation will be made before the implementation of the methods</a:t>
+            </a:r>
+          </a:p>
+          <a:p>
+            <a:r>
+              <a:rPr lang="en-US" dirty="0"/>
+              <a:t>UML Diagrams</a:t>
+            </a:r>
+          </a:p>
+          <a:p>
+            <a:pPr lvl="1"/>
+            <a:r>
+              <a:rPr lang="en-US" dirty="0"/>
+              <a:t>Changes in methods and attributes in Reliability Visualization and Reliability Analysis will be reflected in their UML Diagrams.</a:t>
+            </a:r>
+            <a:endParaRPr lang="en-US" b="0" dirty="0">
+              <a:solidFill>
+                <a:srgbClr val="A6ACCD"/>
+              </a:solidFill>
+              <a:effectLst/>
+              <a:latin typeface="Menlo" panose="020B0609030804020204" pitchFamily="49" charset="0"/>
+            </a:endParaRPr>
+          </a:p>
+          <a:p>
+            <a:pPr lvl="1"/>
+            <a:endParaRPr lang="en-US" dirty="0"/>
+          </a:p>
+          <a:p>
+            <a:pPr marL="450000" lvl="1" indent="0">
               <a:buNone/>
             </a:pPr>
-            <a:r>
-              <a:rPr lang="en-US" dirty="0"/>
-              <a:t>In order to make sure our implementation is working as intended we </a:t>
-            </a:r>
-            <a:r>
-              <a:rPr lang="en-US"/>
-              <a:t>will have to </a:t>
-            </a:r>
             <a:endParaRPr lang="en-US" dirty="0"/>
           </a:p>
         </p:txBody>
@@ -6522,7 +6654,7 @@
     </p:spTree>
     <p:extLst>
       <p:ext uri="{BB962C8B-B14F-4D97-AF65-F5344CB8AC3E}">
-        <p14:creationId xmlns:p14="http://schemas.microsoft.com/office/powerpoint/2010/main" val="1427136132"/>
+        <p14:creationId xmlns:p14="http://schemas.microsoft.com/office/powerpoint/2010/main" val="1590547794"/>
       </p:ext>
     </p:extLst>
   </p:cSld>
@@ -6570,7 +6702,10 @@
           <a:bodyPr/>
           <a:lstStyle/>
           <a:p>
-            <a:endParaRPr lang="en-US"/>
+            <a:r>
+              <a:rPr lang="en-US" dirty="0"/>
+              <a:t>Sprint 2 - Task Order and Duties</a:t>
+            </a:r>
           </a:p>
         </p:txBody>
       </p:sp>
@@ -6595,7 +6730,103 @@
           <a:bodyPr/>
           <a:lstStyle/>
           <a:p>
-            <a:endParaRPr lang="en-US"/>
+            <a:pPr marL="494100" indent="-457200">
+              <a:buFont typeface="+mj-lt"/>
+              <a:buAutoNum type="arabicPeriod"/>
+            </a:pPr>
+            <a:r>
+              <a:rPr lang="en-US" dirty="0"/>
+              <a:t>ReadMe File (Ethan)</a:t>
+            </a:r>
+          </a:p>
+          <a:p>
+            <a:pPr marL="494100" indent="-457200">
+              <a:buFont typeface="+mj-lt"/>
+              <a:buAutoNum type="arabicPeriod"/>
+            </a:pPr>
+            <a:r>
+              <a:rPr lang="en-US" dirty="0"/>
+              <a:t>JUnit Test (Julian)</a:t>
+            </a:r>
+          </a:p>
+          <a:p>
+            <a:pPr marL="494100" indent="-457200">
+              <a:buFont typeface="+mj-lt"/>
+              <a:buAutoNum type="arabicPeriod"/>
+            </a:pPr>
+            <a:r>
+              <a:rPr lang="en-US" dirty="0"/>
+              <a:t>Update UML Diagram (</a:t>
+            </a:r>
+            <a:r>
+              <a:rPr lang="en-US" dirty="0" err="1"/>
+              <a:t>Avi</a:t>
+            </a:r>
+            <a:r>
+              <a:rPr lang="en-US" dirty="0"/>
+              <a:t>)</a:t>
+            </a:r>
+          </a:p>
+          <a:p>
+            <a:pPr marL="494100" indent="-457200">
+              <a:buFont typeface="+mj-lt"/>
+              <a:buAutoNum type="arabicPeriod"/>
+            </a:pPr>
+            <a:r>
+              <a:rPr lang="en-US" dirty="0"/>
+              <a:t>Write Java Docs (Ethan)</a:t>
+            </a:r>
+          </a:p>
+          <a:p>
+            <a:pPr marL="494100" indent="-457200">
+              <a:buFont typeface="+mj-lt"/>
+              <a:buAutoNum type="arabicPeriod"/>
+            </a:pPr>
+            <a:r>
+              <a:rPr lang="en-US" dirty="0"/>
+              <a:t>Implement three methods in Visualization (Patrick)</a:t>
+            </a:r>
+          </a:p>
+          <a:p>
+            <a:pPr marL="871200" lvl="1" indent="-457200">
+              <a:buFont typeface="+mj-lt"/>
+              <a:buAutoNum type="arabicPeriod"/>
+            </a:pPr>
+            <a:r>
+              <a:rPr lang="en-US" dirty="0"/>
+              <a:t>Initialize</a:t>
+            </a:r>
+          </a:p>
+          <a:p>
+            <a:pPr marL="871200" lvl="1" indent="-457200">
+              <a:buFont typeface="+mj-lt"/>
+              <a:buAutoNum type="arabicPeriod"/>
+            </a:pPr>
+            <a:r>
+              <a:rPr lang="en-US" dirty="0"/>
+              <a:t>Visualization</a:t>
+            </a:r>
+          </a:p>
+          <a:p>
+            <a:pPr marL="871200" lvl="1" indent="-457200">
+              <a:buFont typeface="+mj-lt"/>
+              <a:buAutoNum type="arabicPeriod"/>
+            </a:pPr>
+            <a:r>
+              <a:rPr lang="en-US" dirty="0" err="1"/>
+              <a:t>fileVisualization</a:t>
+            </a:r>
+            <a:endParaRPr lang="en-US" dirty="0"/>
+          </a:p>
+          <a:p>
+            <a:pPr marL="494100" indent="-457200">
+              <a:buFont typeface="+mj-lt"/>
+              <a:buAutoNum type="arabicPeriod"/>
+            </a:pPr>
+            <a:r>
+              <a:rPr lang="en-US" dirty="0"/>
+              <a:t>Plan for next sprint (All)</a:t>
+            </a:r>
           </a:p>
         </p:txBody>
       </p:sp>
@@ -6603,6 +6834,184 @@
     <p:extLst>
       <p:ext uri="{BB962C8B-B14F-4D97-AF65-F5344CB8AC3E}">
         <p14:creationId xmlns:p14="http://schemas.microsoft.com/office/powerpoint/2010/main" val="116019016"/>
+      </p:ext>
+    </p:extLst>
+  </p:cSld>
+  <p:clrMapOvr>
+    <a:masterClrMapping/>
+  </p:clrMapOvr>
+</p:sld>
+</file>
+
+<file path=ppt/slides/slide7.xml><?xml version="1.0" encoding="utf-8"?>
+<p:sld xmlns:a="http://schemas.openxmlformats.org/drawingml/2006/main" xmlns:r="http://schemas.openxmlformats.org/officeDocument/2006/relationships" xmlns:p="http://schemas.openxmlformats.org/presentationml/2006/main">
+  <p:cSld>
+    <p:spTree>
+      <p:nvGrpSpPr>
+        <p:cNvPr id="1" name=""/>
+        <p:cNvGrpSpPr/>
+        <p:nvPr/>
+      </p:nvGrpSpPr>
+      <p:grpSpPr>
+        <a:xfrm>
+          <a:off x="0" y="0"/>
+          <a:ext cx="0" cy="0"/>
+          <a:chOff x="0" y="0"/>
+          <a:chExt cx="0" cy="0"/>
+        </a:xfrm>
+      </p:grpSpPr>
+      <p:sp>
+        <p:nvSpPr>
+          <p:cNvPr id="2" name="Title 1">
+            <a:extLst>
+              <a:ext uri="{FF2B5EF4-FFF2-40B4-BE49-F238E27FC236}">
+                <a16:creationId xmlns:a16="http://schemas.microsoft.com/office/drawing/2014/main" id="{B1FADD70-3DE5-C5BC-CCA3-A24B50178F31}"/>
+              </a:ext>
+            </a:extLst>
+          </p:cNvPr>
+          <p:cNvSpPr>
+            <a:spLocks noGrp="1"/>
+          </p:cNvSpPr>
+          <p:nvPr>
+            <p:ph type="title"/>
+          </p:nvPr>
+        </p:nvSpPr>
+        <p:spPr/>
+        <p:txBody>
+          <a:bodyPr/>
+          <a:lstStyle/>
+          <a:p>
+            <a:r>
+              <a:rPr lang="en-US" dirty="0"/>
+              <a:t>Sprint 3 - Task Order and Duties</a:t>
+            </a:r>
+          </a:p>
+        </p:txBody>
+      </p:sp>
+      <p:sp>
+        <p:nvSpPr>
+          <p:cNvPr id="3" name="Content Placeholder 2">
+            <a:extLst>
+              <a:ext uri="{FF2B5EF4-FFF2-40B4-BE49-F238E27FC236}">
+                <a16:creationId xmlns:a16="http://schemas.microsoft.com/office/drawing/2014/main" id="{04347997-F041-92D7-42B3-81541551696B}"/>
+              </a:ext>
+            </a:extLst>
+          </p:cNvPr>
+          <p:cNvSpPr>
+            <a:spLocks noGrp="1"/>
+          </p:cNvSpPr>
+          <p:nvPr>
+            <p:ph idx="1"/>
+          </p:nvPr>
+        </p:nvSpPr>
+        <p:spPr/>
+        <p:txBody>
+          <a:bodyPr/>
+          <a:lstStyle/>
+          <a:p>
+            <a:pPr marL="494100" indent="-457200">
+              <a:buFont typeface="+mj-lt"/>
+              <a:buAutoNum type="arabicPeriod"/>
+            </a:pPr>
+            <a:r>
+              <a:rPr lang="en-US" dirty="0"/>
+              <a:t>ReadMe File (Ethan)</a:t>
+            </a:r>
+          </a:p>
+          <a:p>
+            <a:pPr marL="494100" indent="-457200">
+              <a:buFont typeface="+mj-lt"/>
+              <a:buAutoNum type="arabicPeriod"/>
+            </a:pPr>
+            <a:r>
+              <a:rPr lang="en-US" dirty="0"/>
+              <a:t>JUnit Test (Patrick)</a:t>
+            </a:r>
+          </a:p>
+          <a:p>
+            <a:pPr marL="494100" indent="-457200">
+              <a:buFont typeface="+mj-lt"/>
+              <a:buAutoNum type="arabicPeriod"/>
+            </a:pPr>
+            <a:r>
+              <a:rPr lang="en-US" dirty="0"/>
+              <a:t>Update UML Diagram (Ethan)</a:t>
+            </a:r>
+          </a:p>
+          <a:p>
+            <a:pPr marL="494100" indent="-457200">
+              <a:buFont typeface="+mj-lt"/>
+              <a:buAutoNum type="arabicPeriod"/>
+            </a:pPr>
+            <a:r>
+              <a:rPr lang="en-US" dirty="0"/>
+              <a:t>Write Java Doc (Ethan)</a:t>
+            </a:r>
+          </a:p>
+          <a:p>
+            <a:pPr marL="494100" indent="-457200">
+              <a:buFont typeface="+mj-lt"/>
+              <a:buAutoNum type="arabicPeriod"/>
+            </a:pPr>
+            <a:r>
+              <a:rPr lang="en-US" dirty="0"/>
+              <a:t>Implement five methods in </a:t>
+            </a:r>
+            <a:r>
+              <a:rPr lang="en-US" dirty="0" err="1"/>
+              <a:t>ReliabilityAnalysis</a:t>
+            </a:r>
+            <a:r>
+              <a:rPr lang="en-US" dirty="0"/>
+              <a:t> (</a:t>
+            </a:r>
+            <a:r>
+              <a:rPr lang="en-US" dirty="0" err="1"/>
+              <a:t>Avi</a:t>
+            </a:r>
+            <a:r>
+              <a:rPr lang="en-US" dirty="0"/>
+              <a:t> and Julian)</a:t>
+            </a:r>
+          </a:p>
+          <a:p>
+            <a:pPr marL="871200" lvl="1" indent="-457200">
+              <a:buFont typeface="+mj-lt"/>
+              <a:buAutoNum type="arabicPeriod"/>
+            </a:pPr>
+            <a:r>
+              <a:rPr lang="en-US" dirty="0" err="1"/>
+              <a:t>getReliabilities</a:t>
+            </a:r>
+            <a:endParaRPr lang="en-US" dirty="0"/>
+          </a:p>
+          <a:p>
+            <a:pPr marL="871200" lvl="1" indent="-457200">
+              <a:buFont typeface="+mj-lt"/>
+              <a:buAutoNum type="arabicPeriod"/>
+            </a:pPr>
+            <a:r>
+              <a:rPr lang="en-US" dirty="0" err="1"/>
+              <a:t>verifyReliabilities</a:t>
+            </a:r>
+            <a:endParaRPr lang="en-US" dirty="0"/>
+          </a:p>
+          <a:p>
+            <a:pPr marL="871200" lvl="1" indent="-457200">
+              <a:buFont typeface="+mj-lt"/>
+              <a:buAutoNum type="arabicPeriod"/>
+            </a:pPr>
+            <a:r>
+              <a:rPr lang="en-US" dirty="0"/>
+              <a:t>Helper methods 1-3</a:t>
+            </a:r>
+          </a:p>
+        </p:txBody>
+      </p:sp>
+    </p:spTree>
+    <p:extLst>
+      <p:ext uri="{BB962C8B-B14F-4D97-AF65-F5344CB8AC3E}">
+        <p14:creationId xmlns:p14="http://schemas.microsoft.com/office/powerpoint/2010/main" val="3787621833"/>
       </p:ext>
     </p:extLst>
   </p:cSld>

</xml_diff>

<commit_message>
ReadME, PPT, RA docs
</commit_message>
<xml_diff>
--- a/SWD Project Plan.pptx
+++ b/SWD Project Plan.pptx
@@ -12,6 +12,8 @@
     <p:sldId id="263" r:id="rId6"/>
     <p:sldId id="261" r:id="rId7"/>
     <p:sldId id="264" r:id="rId8"/>
+    <p:sldId id="265" r:id="rId9"/>
+    <p:sldId id="266" r:id="rId10"/>
   </p:sldIdLst>
   <p:sldSz cx="12192000" cy="6858000"/>
   <p:notesSz cx="6858000" cy="9144000"/>
@@ -303,7 +305,7 @@
           <a:p>
             <a:fld id="{1E897544-ABA6-420B-8106-CC874CB02088}" type="datetimeFigureOut">
               <a:rPr lang="en-US" smtClean="0"/>
-              <a:t>4/10/23</a:t>
+              <a:t>5/3/23</a:t>
             </a:fld>
             <a:endParaRPr lang="en-US"/>
           </a:p>
@@ -601,7 +603,7 @@
           <a:p>
             <a:fld id="{1E897544-ABA6-420B-8106-CC874CB02088}" type="datetimeFigureOut">
               <a:rPr lang="en-US" smtClean="0"/>
-              <a:t>4/10/23</a:t>
+              <a:t>5/3/23</a:t>
             </a:fld>
             <a:endParaRPr lang="en-US"/>
           </a:p>
@@ -793,7 +795,7 @@
           <a:p>
             <a:fld id="{1E897544-ABA6-420B-8106-CC874CB02088}" type="datetimeFigureOut">
               <a:rPr lang="en-US" smtClean="0"/>
-              <a:t>4/10/23</a:t>
+              <a:t>5/3/23</a:t>
             </a:fld>
             <a:endParaRPr lang="en-US"/>
           </a:p>
@@ -1054,7 +1056,7 @@
           <a:p>
             <a:fld id="{1E897544-ABA6-420B-8106-CC874CB02088}" type="datetimeFigureOut">
               <a:rPr lang="en-US" smtClean="0"/>
-              <a:t>4/10/23</a:t>
+              <a:t>5/3/23</a:t>
             </a:fld>
             <a:endParaRPr lang="en-US"/>
           </a:p>
@@ -1478,7 +1480,7 @@
           <a:p>
             <a:fld id="{1E897544-ABA6-420B-8106-CC874CB02088}" type="datetimeFigureOut">
               <a:rPr lang="en-US" smtClean="0"/>
-              <a:t>4/10/23</a:t>
+              <a:t>5/3/23</a:t>
             </a:fld>
             <a:endParaRPr lang="en-US"/>
           </a:p>
@@ -2015,7 +2017,7 @@
           <a:p>
             <a:fld id="{1E897544-ABA6-420B-8106-CC874CB02088}" type="datetimeFigureOut">
               <a:rPr lang="en-US" smtClean="0"/>
-              <a:t>4/10/23</a:t>
+              <a:t>5/3/23</a:t>
             </a:fld>
             <a:endParaRPr lang="en-US"/>
           </a:p>
@@ -2879,7 +2881,7 @@
           <a:p>
             <a:fld id="{1E897544-ABA6-420B-8106-CC874CB02088}" type="datetimeFigureOut">
               <a:rPr lang="en-US" smtClean="0"/>
-              <a:t>4/10/23</a:t>
+              <a:t>5/3/23</a:t>
             </a:fld>
             <a:endParaRPr lang="en-US"/>
           </a:p>
@@ -3049,7 +3051,7 @@
           <a:p>
             <a:fld id="{1E897544-ABA6-420B-8106-CC874CB02088}" type="datetimeFigureOut">
               <a:rPr lang="en-US" smtClean="0"/>
-              <a:t>4/10/23</a:t>
+              <a:t>5/3/23</a:t>
             </a:fld>
             <a:endParaRPr lang="en-US"/>
           </a:p>
@@ -3233,7 +3235,7 @@
           <a:p>
             <a:fld id="{1E897544-ABA6-420B-8106-CC874CB02088}" type="datetimeFigureOut">
               <a:rPr lang="en-US" smtClean="0"/>
-              <a:t>4/10/23</a:t>
+              <a:t>5/3/23</a:t>
             </a:fld>
             <a:endParaRPr lang="en-US"/>
           </a:p>
@@ -3403,7 +3405,7 @@
           <a:p>
             <a:fld id="{1E897544-ABA6-420B-8106-CC874CB02088}" type="datetimeFigureOut">
               <a:rPr lang="en-US" smtClean="0"/>
-              <a:t>4/10/23</a:t>
+              <a:t>5/3/23</a:t>
             </a:fld>
             <a:endParaRPr lang="en-US"/>
           </a:p>
@@ -3647,7 +3649,7 @@
           <a:p>
             <a:fld id="{1E897544-ABA6-420B-8106-CC874CB02088}" type="datetimeFigureOut">
               <a:rPr lang="en-US" smtClean="0"/>
-              <a:t>4/10/23</a:t>
+              <a:t>5/3/23</a:t>
             </a:fld>
             <a:endParaRPr lang="en-US"/>
           </a:p>
@@ -3883,7 +3885,7 @@
           <a:p>
             <a:fld id="{1E897544-ABA6-420B-8106-CC874CB02088}" type="datetimeFigureOut">
               <a:rPr lang="en-US" smtClean="0"/>
-              <a:t>4/10/23</a:t>
+              <a:t>5/3/23</a:t>
             </a:fld>
             <a:endParaRPr lang="en-US"/>
           </a:p>
@@ -4349,7 +4351,7 @@
           <a:p>
             <a:fld id="{1E897544-ABA6-420B-8106-CC874CB02088}" type="datetimeFigureOut">
               <a:rPr lang="en-US" smtClean="0"/>
-              <a:t>4/10/23</a:t>
+              <a:t>5/3/23</a:t>
             </a:fld>
             <a:endParaRPr lang="en-US"/>
           </a:p>
@@ -4467,7 +4469,7 @@
           <a:p>
             <a:fld id="{1E897544-ABA6-420B-8106-CC874CB02088}" type="datetimeFigureOut">
               <a:rPr lang="en-US" smtClean="0"/>
-              <a:t>4/10/23</a:t>
+              <a:t>5/3/23</a:t>
             </a:fld>
             <a:endParaRPr lang="en-US"/>
           </a:p>
@@ -4562,7 +4564,7 @@
           <a:p>
             <a:fld id="{1E897544-ABA6-420B-8106-CC874CB02088}" type="datetimeFigureOut">
               <a:rPr lang="en-US" smtClean="0"/>
-              <a:t>4/10/23</a:t>
+              <a:t>5/3/23</a:t>
             </a:fld>
             <a:endParaRPr lang="en-US"/>
           </a:p>
@@ -4817,7 +4819,7 @@
           <a:p>
             <a:fld id="{1E897544-ABA6-420B-8106-CC874CB02088}" type="datetimeFigureOut">
               <a:rPr lang="en-US" smtClean="0"/>
-              <a:t>4/10/23</a:t>
+              <a:t>5/3/23</a:t>
             </a:fld>
             <a:endParaRPr lang="en-US"/>
           </a:p>
@@ -5117,7 +5119,7 @@
           <a:p>
             <a:fld id="{1E897544-ABA6-420B-8106-CC874CB02088}" type="datetimeFigureOut">
               <a:rPr lang="en-US" smtClean="0"/>
-              <a:t>4/10/23</a:t>
+              <a:t>5/3/23</a:t>
             </a:fld>
             <a:endParaRPr lang="en-US"/>
           </a:p>
@@ -5351,7 +5353,7 @@
           <a:p>
             <a:fld id="{1E897544-ABA6-420B-8106-CC874CB02088}" type="datetimeFigureOut">
               <a:rPr lang="en-US" smtClean="0"/>
-              <a:t>4/10/23</a:t>
+              <a:t>5/3/23</a:t>
             </a:fld>
             <a:endParaRPr lang="en-US"/>
           </a:p>
@@ -6167,7 +6169,9 @@
         </p:nvSpPr>
         <p:spPr/>
         <p:txBody>
-          <a:bodyPr/>
+          <a:bodyPr>
+            <a:normAutofit lnSpcReduction="10000"/>
+          </a:bodyPr>
           <a:lstStyle/>
           <a:p>
             <a:pPr marL="36900" indent="0">
@@ -6192,10 +6196,9 @@
           </a:p>
           <a:p>
             <a:r>
-              <a:rPr lang="en-US"/>
+              <a:rPr lang="en-US" dirty="0"/>
               <a:t>Miscellaneous Tasks</a:t>
             </a:r>
-            <a:endParaRPr lang="en-US" dirty="0"/>
           </a:p>
           <a:p>
             <a:r>
@@ -6207,6 +6210,18 @@
             <a:r>
               <a:rPr lang="en-US" dirty="0"/>
               <a:t>Sprint 3 plan</a:t>
+            </a:r>
+          </a:p>
+          <a:p>
+            <a:r>
+              <a:rPr lang="en-US" dirty="0"/>
+              <a:t>Technical Overview of Reliability Visualization</a:t>
+            </a:r>
+          </a:p>
+          <a:p>
+            <a:r>
+              <a:rPr lang="en-US" dirty="0"/>
+              <a:t>Technical Overview of Reliability Analysis</a:t>
             </a:r>
           </a:p>
           <a:p>
@@ -6311,7 +6326,7 @@
             </a:r>
             <a:r>
               <a:rPr lang="en-US" dirty="0"/>
-              <a:t> class (Complete by April 20</a:t>
+              <a:t> class (Complete by April 30</a:t>
             </a:r>
             <a:r>
               <a:rPr lang="en-US" baseline="30000" dirty="0"/>
@@ -6791,7 +6806,7 @@
         <p:spPr/>
         <p:txBody>
           <a:bodyPr>
-            <a:normAutofit lnSpcReduction="10000"/>
+            <a:normAutofit fontScale="77500" lnSpcReduction="20000"/>
           </a:bodyPr>
           <a:lstStyle/>
           <a:p>
@@ -6858,9 +6873,10 @@
               <a:buAutoNum type="arabicPeriod"/>
             </a:pPr>
             <a:r>
-              <a:rPr lang="en-US" dirty="0"/>
-              <a:t>Initialize</a:t>
-            </a:r>
+              <a:rPr lang="en-US" dirty="0" err="1"/>
+              <a:t>createTitle</a:t>
+            </a:r>
+            <a:endParaRPr lang="en-US" dirty="0"/>
           </a:p>
           <a:p>
             <a:pPr marL="871200" lvl="1" indent="-457200">
@@ -6868,9 +6884,10 @@
               <a:buAutoNum type="arabicPeriod"/>
             </a:pPr>
             <a:r>
-              <a:rPr lang="en-US" dirty="0"/>
-              <a:t>Visualization</a:t>
-            </a:r>
+              <a:rPr lang="en-US" dirty="0" err="1"/>
+              <a:t>displayVisualization</a:t>
+            </a:r>
+            <a:endParaRPr lang="en-US" dirty="0"/>
           </a:p>
           <a:p>
             <a:pPr marL="871200" lvl="1" indent="-457200">
@@ -6879,7 +6896,7 @@
             </a:pPr>
             <a:r>
               <a:rPr lang="en-US" dirty="0" err="1"/>
-              <a:t>createHeader</a:t>
+              <a:t>createColumnHeader</a:t>
             </a:r>
             <a:endParaRPr lang="en-US" dirty="0"/>
           </a:p>
@@ -6890,8 +6907,37 @@
             </a:pPr>
             <a:r>
               <a:rPr lang="en-US" dirty="0" err="1"/>
+              <a:t>createVisualizationData</a:t>
+            </a:r>
+            <a:endParaRPr lang="en-US" dirty="0"/>
+          </a:p>
+          <a:p>
+            <a:pPr marL="871200" lvl="1" indent="-457200">
+              <a:buFont typeface="+mj-lt"/>
+              <a:buAutoNum type="arabicPeriod"/>
+            </a:pPr>
+            <a:r>
+              <a:rPr lang="en-US" dirty="0" err="1"/>
+              <a:t>createHeader</a:t>
+            </a:r>
+            <a:endParaRPr lang="en-US" dirty="0"/>
+          </a:p>
+          <a:p>
+            <a:pPr marL="871200" lvl="1" indent="-457200">
+              <a:buFont typeface="+mj-lt"/>
+              <a:buAutoNum type="arabicPeriod"/>
+            </a:pPr>
+            <a:r>
+              <a:rPr lang="en-US" dirty="0" err="1"/>
               <a:t>createFooter</a:t>
             </a:r>
+            <a:endParaRPr lang="en-US" dirty="0"/>
+          </a:p>
+          <a:p>
+            <a:pPr marL="871200" lvl="1" indent="-457200">
+              <a:buFont typeface="+mj-lt"/>
+              <a:buAutoNum type="arabicPeriod"/>
+            </a:pPr>
             <a:endParaRPr lang="en-US" dirty="0"/>
           </a:p>
           <a:p>
@@ -6982,7 +7028,9 @@
         </p:nvSpPr>
         <p:spPr/>
         <p:txBody>
-          <a:bodyPr/>
+          <a:bodyPr>
+            <a:normAutofit lnSpcReduction="10000"/>
+          </a:bodyPr>
           <a:lstStyle/>
           <a:p>
             <a:pPr marL="494100" indent="-457200">
@@ -7078,9 +7126,39 @@
               <a:buAutoNum type="arabicPeriod"/>
             </a:pPr>
             <a:r>
-              <a:rPr lang="en-US" dirty="0"/>
-              <a:t>Helper methods 1-3</a:t>
-            </a:r>
+              <a:rPr lang="en-US" dirty="0" err="1"/>
+              <a:t>calcNextNodeReliability</a:t>
+            </a:r>
+            <a:endParaRPr lang="en-US" dirty="0"/>
+          </a:p>
+          <a:p>
+            <a:pPr marL="871200" lvl="1" indent="-457200">
+              <a:buFont typeface="+mj-lt"/>
+              <a:buAutoNum type="arabicPeriod"/>
+            </a:pPr>
+            <a:r>
+              <a:rPr lang="en-US" dirty="0" err="1"/>
+              <a:t>fillInReliabilities</a:t>
+            </a:r>
+            <a:endParaRPr lang="en-US" dirty="0"/>
+          </a:p>
+          <a:p>
+            <a:pPr marL="871200" lvl="1" indent="-457200">
+              <a:buFont typeface="+mj-lt"/>
+              <a:buAutoNum type="arabicPeriod"/>
+            </a:pPr>
+            <a:r>
+              <a:rPr lang="en-US" dirty="0" err="1"/>
+              <a:t>buildReliabilityTable</a:t>
+            </a:r>
+            <a:endParaRPr lang="en-US" dirty="0"/>
+          </a:p>
+          <a:p>
+            <a:pPr marL="871200" lvl="1" indent="-457200">
+              <a:buFont typeface="+mj-lt"/>
+              <a:buAutoNum type="arabicPeriod"/>
+            </a:pPr>
+            <a:endParaRPr lang="en-US" dirty="0"/>
           </a:p>
         </p:txBody>
       </p:sp>
@@ -7088,6 +7166,291 @@
     <p:extLst>
       <p:ext uri="{BB962C8B-B14F-4D97-AF65-F5344CB8AC3E}">
         <p14:creationId xmlns:p14="http://schemas.microsoft.com/office/powerpoint/2010/main" val="3787621833"/>
+      </p:ext>
+    </p:extLst>
+  </p:cSld>
+  <p:clrMapOvr>
+    <a:masterClrMapping/>
+  </p:clrMapOvr>
+</p:sld>
+</file>
+
+<file path=ppt/slides/slide8.xml><?xml version="1.0" encoding="utf-8"?>
+<p:sld xmlns:a="http://schemas.openxmlformats.org/drawingml/2006/main" xmlns:r="http://schemas.openxmlformats.org/officeDocument/2006/relationships" xmlns:p="http://schemas.openxmlformats.org/presentationml/2006/main">
+  <p:cSld>
+    <p:spTree>
+      <p:nvGrpSpPr>
+        <p:cNvPr id="1" name=""/>
+        <p:cNvGrpSpPr/>
+        <p:nvPr/>
+      </p:nvGrpSpPr>
+      <p:grpSpPr>
+        <a:xfrm>
+          <a:off x="0" y="0"/>
+          <a:ext cx="0" cy="0"/>
+          <a:chOff x="0" y="0"/>
+          <a:chExt cx="0" cy="0"/>
+        </a:xfrm>
+      </p:grpSpPr>
+      <p:sp>
+        <p:nvSpPr>
+          <p:cNvPr id="2" name="Title 1">
+            <a:extLst>
+              <a:ext uri="{FF2B5EF4-FFF2-40B4-BE49-F238E27FC236}">
+                <a16:creationId xmlns:a16="http://schemas.microsoft.com/office/drawing/2014/main" id="{6EF00B2F-5DCD-CD8F-A340-DC26C9698A59}"/>
+              </a:ext>
+            </a:extLst>
+          </p:cNvPr>
+          <p:cNvSpPr>
+            <a:spLocks noGrp="1"/>
+          </p:cNvSpPr>
+          <p:nvPr>
+            <p:ph type="title"/>
+          </p:nvPr>
+        </p:nvSpPr>
+        <p:spPr/>
+        <p:txBody>
+          <a:bodyPr>
+            <a:normAutofit fontScale="90000"/>
+          </a:bodyPr>
+          <a:lstStyle/>
+          <a:p>
+            <a:r>
+              <a:rPr lang="en-US" dirty="0"/>
+              <a:t>Technical Overview of Reliability Visualization</a:t>
+            </a:r>
+          </a:p>
+        </p:txBody>
+      </p:sp>
+      <p:sp>
+        <p:nvSpPr>
+          <p:cNvPr id="3" name="Content Placeholder 2">
+            <a:extLst>
+              <a:ext uri="{FF2B5EF4-FFF2-40B4-BE49-F238E27FC236}">
+                <a16:creationId xmlns:a16="http://schemas.microsoft.com/office/drawing/2014/main" id="{115DEF46-9003-692E-402B-6748BCCFC33E}"/>
+              </a:ext>
+            </a:extLst>
+          </p:cNvPr>
+          <p:cNvSpPr>
+            <a:spLocks noGrp="1"/>
+          </p:cNvSpPr>
+          <p:nvPr>
+            <p:ph idx="1"/>
+          </p:nvPr>
+        </p:nvSpPr>
+        <p:spPr/>
+        <p:txBody>
+          <a:bodyPr>
+            <a:normAutofit/>
+          </a:bodyPr>
+          <a:lstStyle/>
+          <a:p>
+            <a:r>
+              <a:rPr lang="en-US" dirty="0"/>
+              <a:t>Reliability Visualization will be based on the implementation of </a:t>
+            </a:r>
+            <a:r>
+              <a:rPr lang="en-US" dirty="0" err="1"/>
+              <a:t>ProgramVisualization</a:t>
+            </a:r>
+            <a:endParaRPr lang="en-US" dirty="0"/>
+          </a:p>
+          <a:p>
+            <a:r>
+              <a:rPr lang="en-US" dirty="0"/>
+              <a:t>Reliability Visualization handles creating the output file</a:t>
+            </a:r>
+          </a:p>
+          <a:p>
+            <a:pPr lvl="1"/>
+            <a:r>
+              <a:rPr lang="en-US" dirty="0"/>
+              <a:t>Creates the header, title, and </a:t>
+            </a:r>
+            <a:r>
+              <a:rPr lang="en-US" dirty="0" err="1"/>
+              <a:t>columnheaders</a:t>
+            </a:r>
+            <a:endParaRPr lang="en-US" dirty="0"/>
+          </a:p>
+          <a:p>
+            <a:pPr lvl="2"/>
+            <a:r>
+              <a:rPr lang="en-US" dirty="0"/>
+              <a:t>Finds this information from methods in its Warp</a:t>
+            </a:r>
+          </a:p>
+          <a:p>
+            <a:pPr lvl="1"/>
+            <a:r>
+              <a:rPr lang="en-US" dirty="0"/>
+              <a:t>Fill in the data for the contents of the file</a:t>
+            </a:r>
+          </a:p>
+          <a:p>
+            <a:pPr lvl="2"/>
+            <a:r>
+              <a:rPr lang="en-US" dirty="0"/>
+              <a:t>Calls </a:t>
+            </a:r>
+            <a:r>
+              <a:rPr lang="en-US" dirty="0" err="1"/>
+              <a:t>getReliabilities</a:t>
+            </a:r>
+            <a:r>
+              <a:rPr lang="en-US" dirty="0"/>
+              <a:t> from Reliability Analysis, which return a Reliability Table</a:t>
+            </a:r>
+          </a:p>
+          <a:p>
+            <a:pPr lvl="2"/>
+            <a:r>
+              <a:rPr lang="en-US" dirty="0"/>
+              <a:t>Cast the Reliability Table to a 2D String array.</a:t>
+            </a:r>
+          </a:p>
+          <a:p>
+            <a:pPr lvl="2"/>
+            <a:endParaRPr lang="en-US" dirty="0"/>
+          </a:p>
+        </p:txBody>
+      </p:sp>
+    </p:spTree>
+    <p:extLst>
+      <p:ext uri="{BB962C8B-B14F-4D97-AF65-F5344CB8AC3E}">
+        <p14:creationId xmlns:p14="http://schemas.microsoft.com/office/powerpoint/2010/main" val="1672240603"/>
+      </p:ext>
+    </p:extLst>
+  </p:cSld>
+  <p:clrMapOvr>
+    <a:masterClrMapping/>
+  </p:clrMapOvr>
+</p:sld>
+</file>
+
+<file path=ppt/slides/slide9.xml><?xml version="1.0" encoding="utf-8"?>
+<p:sld xmlns:a="http://schemas.openxmlformats.org/drawingml/2006/main" xmlns:r="http://schemas.openxmlformats.org/officeDocument/2006/relationships" xmlns:p="http://schemas.openxmlformats.org/presentationml/2006/main">
+  <p:cSld>
+    <p:spTree>
+      <p:nvGrpSpPr>
+        <p:cNvPr id="1" name=""/>
+        <p:cNvGrpSpPr/>
+        <p:nvPr/>
+      </p:nvGrpSpPr>
+      <p:grpSpPr>
+        <a:xfrm>
+          <a:off x="0" y="0"/>
+          <a:ext cx="0" cy="0"/>
+          <a:chOff x="0" y="0"/>
+          <a:chExt cx="0" cy="0"/>
+        </a:xfrm>
+      </p:grpSpPr>
+      <p:sp>
+        <p:nvSpPr>
+          <p:cNvPr id="2" name="Title 1">
+            <a:extLst>
+              <a:ext uri="{FF2B5EF4-FFF2-40B4-BE49-F238E27FC236}">
+                <a16:creationId xmlns:a16="http://schemas.microsoft.com/office/drawing/2014/main" id="{6EF00B2F-5DCD-CD8F-A340-DC26C9698A59}"/>
+              </a:ext>
+            </a:extLst>
+          </p:cNvPr>
+          <p:cNvSpPr>
+            <a:spLocks noGrp="1"/>
+          </p:cNvSpPr>
+          <p:nvPr>
+            <p:ph type="title"/>
+          </p:nvPr>
+        </p:nvSpPr>
+        <p:spPr/>
+        <p:txBody>
+          <a:bodyPr>
+            <a:normAutofit/>
+          </a:bodyPr>
+          <a:lstStyle/>
+          <a:p>
+            <a:r>
+              <a:rPr lang="en-US" dirty="0"/>
+              <a:t>Technical Overview of Reliability Analysis</a:t>
+            </a:r>
+          </a:p>
+        </p:txBody>
+      </p:sp>
+      <p:sp>
+        <p:nvSpPr>
+          <p:cNvPr id="3" name="Content Placeholder 2">
+            <a:extLst>
+              <a:ext uri="{FF2B5EF4-FFF2-40B4-BE49-F238E27FC236}">
+                <a16:creationId xmlns:a16="http://schemas.microsoft.com/office/drawing/2014/main" id="{115DEF46-9003-692E-402B-6748BCCFC33E}"/>
+              </a:ext>
+            </a:extLst>
+          </p:cNvPr>
+          <p:cNvSpPr>
+            <a:spLocks noGrp="1"/>
+          </p:cNvSpPr>
+          <p:nvPr>
+            <p:ph idx="1"/>
+          </p:nvPr>
+        </p:nvSpPr>
+        <p:spPr/>
+        <p:txBody>
+          <a:bodyPr>
+            <a:normAutofit/>
+          </a:bodyPr>
+          <a:lstStyle/>
+          <a:p>
+            <a:r>
+              <a:rPr lang="en-US" dirty="0"/>
+              <a:t>A reliability table is built for a program.</a:t>
+            </a:r>
+          </a:p>
+          <a:p>
+            <a:r>
+              <a:rPr lang="en-US" dirty="0"/>
+              <a:t>The program is used to get a workload, which is then used to prioritize flows.</a:t>
+            </a:r>
+          </a:p>
+          <a:p>
+            <a:r>
+              <a:rPr lang="en-US" dirty="0"/>
+              <a:t>A new class called "reliability node" is used to track source nodes and other information.</a:t>
+            </a:r>
+          </a:p>
+          <a:p>
+            <a:r>
+              <a:rPr lang="en-US" dirty="0"/>
+              <a:t>The program is used to get a schedule, which is used to determine the number of columns in the table.</a:t>
+            </a:r>
+          </a:p>
+          <a:p>
+            <a:r>
+              <a:rPr lang="en-US" dirty="0"/>
+              <a:t>The table is instantiated with the number of columns and rows.</a:t>
+            </a:r>
+          </a:p>
+          <a:p>
+            <a:r>
+              <a:rPr lang="en-US" dirty="0"/>
+              <a:t>The reliability table is looped through to ensure the entire column for each source node is 1.0.</a:t>
+            </a:r>
+          </a:p>
+          <a:p>
+            <a:r>
+              <a:rPr lang="en-US" dirty="0"/>
+              <a:t>A helper method is called to build the reliability table when there is an if statement in the schedule.</a:t>
+            </a:r>
+          </a:p>
+          <a:p>
+            <a:pPr marL="810000" lvl="2" indent="0">
+              <a:buNone/>
+            </a:pPr>
+            <a:endParaRPr lang="en-US" dirty="0"/>
+          </a:p>
+        </p:txBody>
+      </p:sp>
+    </p:spTree>
+    <p:extLst>
+      <p:ext uri="{BB962C8B-B14F-4D97-AF65-F5344CB8AC3E}">
+        <p14:creationId xmlns:p14="http://schemas.microsoft.com/office/powerpoint/2010/main" val="3208555437"/>
       </p:ext>
     </p:extLst>
   </p:cSld>

</xml_diff>